<commit_message>
adding 001_cmake_example, adding gitignore, adding information about 001 example into 1 lection pptx
</commit_message>
<xml_diff>
--- a/lections/cpp_craft_lec_1_part_1.pptx
+++ b/lections/cpp_craft_lec_1_part_1.pptx
@@ -11,6 +11,8 @@
     <p:sldId id="259" r:id="rId5"/>
     <p:sldId id="260" r:id="rId6"/>
     <p:sldId id="261" r:id="rId7"/>
+    <p:sldId id="262" r:id="rId8"/>
+    <p:sldId id="263" r:id="rId9"/>
   </p:sldIdLst>
   <p:sldSz cx="9144000" cy="6858000" type="screen4x3"/>
   <p:notesSz cx="6858000" cy="9144000"/>
@@ -293,6 +295,7 @@
           <a:p>
             <a:fld id="{8281312E-8B3E-4748-9BAE-A66E5A6CC2C8}" type="datetimeFigureOut">
               <a:rPr lang="en-US" smtClean="0"/>
+              <a:pPr/>
               <a:t>10/2/2013</a:t>
             </a:fld>
             <a:endParaRPr lang="en-US"/>
@@ -335,6 +338,7 @@
           <a:p>
             <a:fld id="{33FC85C6-34C1-4D45-BA63-3D47A0BDD702}" type="slidenum">
               <a:rPr lang="en-US" smtClean="0"/>
+              <a:pPr/>
               <a:t>‹#›</a:t>
             </a:fld>
             <a:endParaRPr lang="en-US"/>
@@ -458,6 +462,7 @@
           <a:p>
             <a:fld id="{8281312E-8B3E-4748-9BAE-A66E5A6CC2C8}" type="datetimeFigureOut">
               <a:rPr lang="en-US" smtClean="0"/>
+              <a:pPr/>
               <a:t>10/2/2013</a:t>
             </a:fld>
             <a:endParaRPr lang="en-US"/>
@@ -500,6 +505,7 @@
           <a:p>
             <a:fld id="{33FC85C6-34C1-4D45-BA63-3D47A0BDD702}" type="slidenum">
               <a:rPr lang="en-US" smtClean="0"/>
+              <a:pPr/>
               <a:t>‹#›</a:t>
             </a:fld>
             <a:endParaRPr lang="en-US"/>
@@ -633,6 +639,7 @@
           <a:p>
             <a:fld id="{8281312E-8B3E-4748-9BAE-A66E5A6CC2C8}" type="datetimeFigureOut">
               <a:rPr lang="en-US" smtClean="0"/>
+              <a:pPr/>
               <a:t>10/2/2013</a:t>
             </a:fld>
             <a:endParaRPr lang="en-US"/>
@@ -675,6 +682,7 @@
           <a:p>
             <a:fld id="{33FC85C6-34C1-4D45-BA63-3D47A0BDD702}" type="slidenum">
               <a:rPr lang="en-US" smtClean="0"/>
+              <a:pPr/>
               <a:t>‹#›</a:t>
             </a:fld>
             <a:endParaRPr lang="en-US"/>
@@ -798,6 +806,7 @@
           <a:p>
             <a:fld id="{8281312E-8B3E-4748-9BAE-A66E5A6CC2C8}" type="datetimeFigureOut">
               <a:rPr lang="en-US" smtClean="0"/>
+              <a:pPr/>
               <a:t>10/2/2013</a:t>
             </a:fld>
             <a:endParaRPr lang="en-US"/>
@@ -840,6 +849,7 @@
           <a:p>
             <a:fld id="{33FC85C6-34C1-4D45-BA63-3D47A0BDD702}" type="slidenum">
               <a:rPr lang="en-US" smtClean="0"/>
+              <a:pPr/>
               <a:t>‹#›</a:t>
             </a:fld>
             <a:endParaRPr lang="en-US"/>
@@ -1039,6 +1049,7 @@
           <a:p>
             <a:fld id="{8281312E-8B3E-4748-9BAE-A66E5A6CC2C8}" type="datetimeFigureOut">
               <a:rPr lang="en-US" smtClean="0"/>
+              <a:pPr/>
               <a:t>10/2/2013</a:t>
             </a:fld>
             <a:endParaRPr lang="en-US"/>
@@ -1081,6 +1092,7 @@
           <a:p>
             <a:fld id="{33FC85C6-34C1-4D45-BA63-3D47A0BDD702}" type="slidenum">
               <a:rPr lang="en-US" smtClean="0"/>
+              <a:pPr/>
               <a:t>‹#›</a:t>
             </a:fld>
             <a:endParaRPr lang="en-US"/>
@@ -1322,6 +1334,7 @@
           <a:p>
             <a:fld id="{8281312E-8B3E-4748-9BAE-A66E5A6CC2C8}" type="datetimeFigureOut">
               <a:rPr lang="en-US" smtClean="0"/>
+              <a:pPr/>
               <a:t>10/2/2013</a:t>
             </a:fld>
             <a:endParaRPr lang="en-US"/>
@@ -1364,6 +1377,7 @@
           <a:p>
             <a:fld id="{33FC85C6-34C1-4D45-BA63-3D47A0BDD702}" type="slidenum">
               <a:rPr lang="en-US" smtClean="0"/>
+              <a:pPr/>
               <a:t>‹#›</a:t>
             </a:fld>
             <a:endParaRPr lang="en-US"/>
@@ -1739,6 +1753,7 @@
           <a:p>
             <a:fld id="{8281312E-8B3E-4748-9BAE-A66E5A6CC2C8}" type="datetimeFigureOut">
               <a:rPr lang="en-US" smtClean="0"/>
+              <a:pPr/>
               <a:t>10/2/2013</a:t>
             </a:fld>
             <a:endParaRPr lang="en-US"/>
@@ -1781,6 +1796,7 @@
           <a:p>
             <a:fld id="{33FC85C6-34C1-4D45-BA63-3D47A0BDD702}" type="slidenum">
               <a:rPr lang="en-US" smtClean="0"/>
+              <a:pPr/>
               <a:t>‹#›</a:t>
             </a:fld>
             <a:endParaRPr lang="en-US"/>
@@ -1852,6 +1868,7 @@
           <a:p>
             <a:fld id="{8281312E-8B3E-4748-9BAE-A66E5A6CC2C8}" type="datetimeFigureOut">
               <a:rPr lang="en-US" smtClean="0"/>
+              <a:pPr/>
               <a:t>10/2/2013</a:t>
             </a:fld>
             <a:endParaRPr lang="en-US"/>
@@ -1894,6 +1911,7 @@
           <a:p>
             <a:fld id="{33FC85C6-34C1-4D45-BA63-3D47A0BDD702}" type="slidenum">
               <a:rPr lang="en-US" smtClean="0"/>
+              <a:pPr/>
               <a:t>‹#›</a:t>
             </a:fld>
             <a:endParaRPr lang="en-US"/>
@@ -1942,6 +1960,7 @@
           <a:p>
             <a:fld id="{8281312E-8B3E-4748-9BAE-A66E5A6CC2C8}" type="datetimeFigureOut">
               <a:rPr lang="en-US" smtClean="0"/>
+              <a:pPr/>
               <a:t>10/2/2013</a:t>
             </a:fld>
             <a:endParaRPr lang="en-US"/>
@@ -1984,6 +2003,7 @@
           <a:p>
             <a:fld id="{33FC85C6-34C1-4D45-BA63-3D47A0BDD702}" type="slidenum">
               <a:rPr lang="en-US" smtClean="0"/>
+              <a:pPr/>
               <a:t>‹#›</a:t>
             </a:fld>
             <a:endParaRPr lang="en-US"/>
@@ -2214,6 +2234,7 @@
           <a:p>
             <a:fld id="{8281312E-8B3E-4748-9BAE-A66E5A6CC2C8}" type="datetimeFigureOut">
               <a:rPr lang="en-US" smtClean="0"/>
+              <a:pPr/>
               <a:t>10/2/2013</a:t>
             </a:fld>
             <a:endParaRPr lang="en-US"/>
@@ -2256,6 +2277,7 @@
           <a:p>
             <a:fld id="{33FC85C6-34C1-4D45-BA63-3D47A0BDD702}" type="slidenum">
               <a:rPr lang="en-US" smtClean="0"/>
+              <a:pPr/>
               <a:t>‹#›</a:t>
             </a:fld>
             <a:endParaRPr lang="en-US"/>
@@ -2462,6 +2484,7 @@
           <a:p>
             <a:fld id="{8281312E-8B3E-4748-9BAE-A66E5A6CC2C8}" type="datetimeFigureOut">
               <a:rPr lang="en-US" smtClean="0"/>
+              <a:pPr/>
               <a:t>10/2/2013</a:t>
             </a:fld>
             <a:endParaRPr lang="en-US"/>
@@ -2504,6 +2527,7 @@
           <a:p>
             <a:fld id="{33FC85C6-34C1-4D45-BA63-3D47A0BDD702}" type="slidenum">
               <a:rPr lang="en-US" smtClean="0"/>
+              <a:pPr/>
               <a:t>‹#›</a:t>
             </a:fld>
             <a:endParaRPr lang="en-US"/>
@@ -2670,6 +2694,7 @@
           <a:p>
             <a:fld id="{8281312E-8B3E-4748-9BAE-A66E5A6CC2C8}" type="datetimeFigureOut">
               <a:rPr lang="en-US" smtClean="0"/>
+              <a:pPr/>
               <a:t>10/2/2013</a:t>
             </a:fld>
             <a:endParaRPr lang="en-US"/>
@@ -2748,6 +2773,7 @@
           <a:p>
             <a:fld id="{33FC85C6-34C1-4D45-BA63-3D47A0BDD702}" type="slidenum">
               <a:rPr lang="en-US" smtClean="0"/>
+              <a:pPr/>
               <a:t>‹#›</a:t>
             </a:fld>
             <a:endParaRPr lang="en-US"/>
@@ -3891,7 +3917,11 @@
           <a:bodyPr/>
           <a:lstStyle/>
           <a:p>
-            <a:endParaRPr lang="en-US"/>
+            <a:r>
+              <a:rPr lang="en-US" dirty="0" err="1" smtClean="0"/>
+              <a:t>Predizo</a:t>
+            </a:r>
+            <a:endParaRPr lang="en-US" dirty="0"/>
           </a:p>
         </p:txBody>
       </p:sp>
@@ -3909,6 +3939,291 @@
         <p:txBody>
           <a:bodyPr/>
           <a:lstStyle/>
+          <a:p>
+            <a:r>
+              <a:rPr lang="en-US" dirty="0" smtClean="0">
+                <a:hlinkClick r:id="rId2"/>
+              </a:rPr>
+              <a:t>http://www.predizo.com</a:t>
+            </a:r>
+            <a:r>
+              <a:rPr lang="en-US" dirty="0" smtClean="0">
+                <a:hlinkClick r:id="rId2"/>
+              </a:rPr>
+              <a:t>/</a:t>
+            </a:r>
+            <a:endParaRPr lang="en-US" dirty="0" smtClean="0"/>
+          </a:p>
+          <a:p>
+            <a:endParaRPr lang="en-US" dirty="0"/>
+          </a:p>
+        </p:txBody>
+      </p:sp>
+    </p:spTree>
+  </p:cSld>
+  <p:clrMapOvr>
+    <a:masterClrMapping/>
+  </p:clrMapOvr>
+</p:sld>
+</file>
+
+<file path=ppt/slides/slide7.xml><?xml version="1.0" encoding="utf-8"?>
+<p:sld xmlns:a="http://schemas.openxmlformats.org/drawingml/2006/main" xmlns:r="http://schemas.openxmlformats.org/officeDocument/2006/relationships" xmlns:p="http://schemas.openxmlformats.org/presentationml/2006/main">
+  <p:cSld>
+    <p:spTree>
+      <p:nvGrpSpPr>
+        <p:cNvPr id="1" name=""/>
+        <p:cNvGrpSpPr/>
+        <p:nvPr/>
+      </p:nvGrpSpPr>
+      <p:grpSpPr>
+        <a:xfrm>
+          <a:off x="0" y="0"/>
+          <a:ext cx="0" cy="0"/>
+          <a:chOff x="0" y="0"/>
+          <a:chExt cx="0" cy="0"/>
+        </a:xfrm>
+      </p:grpSpPr>
+      <p:sp>
+        <p:nvSpPr>
+          <p:cNvPr id="2" name="Title 1"/>
+          <p:cNvSpPr>
+            <a:spLocks noGrp="1"/>
+          </p:cNvSpPr>
+          <p:nvPr>
+            <p:ph type="title"/>
+          </p:nvPr>
+        </p:nvSpPr>
+        <p:spPr/>
+        <p:txBody>
+          <a:bodyPr/>
+          <a:lstStyle/>
+          <a:p>
+            <a:r>
+              <a:rPr lang="ru-RU" dirty="0" smtClean="0"/>
+              <a:t>Цели </a:t>
+            </a:r>
+            <a:r>
+              <a:rPr lang="en-US" dirty="0" smtClean="0"/>
+              <a:t>C++ Craft</a:t>
+            </a:r>
+            <a:endParaRPr lang="en-US" dirty="0"/>
+          </a:p>
+        </p:txBody>
+      </p:sp>
+      <p:sp>
+        <p:nvSpPr>
+          <p:cNvPr id="3" name="Content Placeholder 2"/>
+          <p:cNvSpPr>
+            <a:spLocks noGrp="1"/>
+          </p:cNvSpPr>
+          <p:nvPr>
+            <p:ph idx="1"/>
+          </p:nvPr>
+        </p:nvSpPr>
+        <p:spPr/>
+        <p:txBody>
+          <a:bodyPr/>
+          <a:lstStyle/>
+          <a:p>
+            <a:r>
+              <a:rPr lang="ru-RU" dirty="0" smtClean="0"/>
+              <a:t>Научиться чему-то новому.</a:t>
+            </a:r>
+          </a:p>
+          <a:p>
+            <a:r>
+              <a:rPr lang="ru-RU" dirty="0" smtClean="0"/>
+              <a:t>Получить практические навыки в задачах максимально приближенных к боевым.</a:t>
+            </a:r>
+            <a:endParaRPr lang="en-US" dirty="0"/>
+          </a:p>
+        </p:txBody>
+      </p:sp>
+    </p:spTree>
+  </p:cSld>
+  <p:clrMapOvr>
+    <a:masterClrMapping/>
+  </p:clrMapOvr>
+</p:sld>
+</file>
+
+<file path=ppt/slides/slide8.xml><?xml version="1.0" encoding="utf-8"?>
+<p:sld xmlns:a="http://schemas.openxmlformats.org/drawingml/2006/main" xmlns:r="http://schemas.openxmlformats.org/officeDocument/2006/relationships" xmlns:p="http://schemas.openxmlformats.org/presentationml/2006/main">
+  <p:cSld>
+    <p:spTree>
+      <p:nvGrpSpPr>
+        <p:cNvPr id="1" name=""/>
+        <p:cNvGrpSpPr/>
+        <p:nvPr/>
+      </p:nvGrpSpPr>
+      <p:grpSpPr>
+        <a:xfrm>
+          <a:off x="0" y="0"/>
+          <a:ext cx="0" cy="0"/>
+          <a:chOff x="0" y="0"/>
+          <a:chExt cx="0" cy="0"/>
+        </a:xfrm>
+      </p:grpSpPr>
+      <p:sp>
+        <p:nvSpPr>
+          <p:cNvPr id="2" name="Title 1"/>
+          <p:cNvSpPr>
+            <a:spLocks noGrp="1"/>
+          </p:cNvSpPr>
+          <p:nvPr>
+            <p:ph type="title"/>
+          </p:nvPr>
+        </p:nvSpPr>
+        <p:spPr/>
+        <p:txBody>
+          <a:bodyPr/>
+          <a:lstStyle/>
+          <a:p>
+            <a:r>
+              <a:rPr lang="en-US" dirty="0" err="1" smtClean="0"/>
+              <a:t>Git</a:t>
+            </a:r>
+            <a:endParaRPr lang="en-US" dirty="0"/>
+          </a:p>
+        </p:txBody>
+      </p:sp>
+      <p:sp>
+        <p:nvSpPr>
+          <p:cNvPr id="3" name="Content Placeholder 2"/>
+          <p:cNvSpPr>
+            <a:spLocks noGrp="1"/>
+          </p:cNvSpPr>
+          <p:nvPr>
+            <p:ph idx="1"/>
+          </p:nvPr>
+        </p:nvSpPr>
+        <p:spPr/>
+        <p:txBody>
+          <a:bodyPr/>
+          <a:lstStyle/>
+          <a:p>
+            <a:r>
+              <a:rPr lang="ru-RU" b="1" dirty="0" smtClean="0">
+                <a:solidFill>
+                  <a:schemeClr val="accent2">
+                    <a:lumMod val="75000"/>
+                  </a:schemeClr>
+                </a:solidFill>
+              </a:rPr>
+              <a:t>Сначала </a:t>
+            </a:r>
+            <a:r>
+              <a:rPr lang="en-US" b="1" dirty="0" err="1" smtClean="0">
+                <a:solidFill>
+                  <a:schemeClr val="accent2">
+                    <a:lumMod val="75000"/>
+                  </a:schemeClr>
+                </a:solidFill>
+              </a:rPr>
+              <a:t>git</a:t>
+            </a:r>
+            <a:r>
+              <a:rPr lang="en-US" b="1" dirty="0" smtClean="0">
+                <a:solidFill>
+                  <a:schemeClr val="accent2">
+                    <a:lumMod val="75000"/>
+                  </a:schemeClr>
+                </a:solidFill>
+              </a:rPr>
+              <a:t> pull </a:t>
+            </a:r>
+            <a:endParaRPr lang="en-US" b="1" dirty="0" smtClean="0">
+              <a:solidFill>
+                <a:schemeClr val="accent2">
+                  <a:lumMod val="75000"/>
+                </a:schemeClr>
+              </a:solidFill>
+            </a:endParaRPr>
+          </a:p>
+          <a:p>
+            <a:r>
+              <a:rPr lang="ru-RU" dirty="0" smtClean="0"/>
+              <a:t>Проверить статус, решить конфликты</a:t>
+            </a:r>
+          </a:p>
+          <a:p>
+            <a:r>
+              <a:rPr lang="ru-RU" dirty="0" smtClean="0"/>
+              <a:t>Залить с адекватным сообщением.</a:t>
+            </a:r>
+          </a:p>
+          <a:p>
+            <a:r>
+              <a:rPr lang="ru-RU" b="1" dirty="0" smtClean="0">
+                <a:solidFill>
+                  <a:schemeClr val="accent2">
+                    <a:lumMod val="75000"/>
+                  </a:schemeClr>
+                </a:solidFill>
+              </a:rPr>
+              <a:t>Сообщения можно исправлять!</a:t>
+            </a:r>
+            <a:endParaRPr lang="ru-RU" b="1" smtClean="0">
+              <a:solidFill>
+                <a:schemeClr val="accent2">
+                  <a:lumMod val="75000"/>
+                </a:schemeClr>
+              </a:solidFill>
+            </a:endParaRPr>
+          </a:p>
+          <a:p>
+            <a:pPr>
+              <a:buNone/>
+            </a:pPr>
+            <a:endParaRPr lang="en-US" b="1" dirty="0" smtClean="0">
+              <a:solidFill>
+                <a:schemeClr val="accent2">
+                  <a:lumMod val="75000"/>
+                </a:schemeClr>
+              </a:solidFill>
+            </a:endParaRPr>
+          </a:p>
+          <a:p>
+            <a:r>
+              <a:rPr lang="en-US" dirty="0" err="1" smtClean="0"/>
+              <a:t>Googleit</a:t>
+            </a:r>
+            <a:r>
+              <a:rPr lang="en-US" dirty="0" smtClean="0"/>
+              <a:t>: “</a:t>
+            </a:r>
+            <a:r>
+              <a:rPr lang="ru-RU" dirty="0" err="1" smtClean="0"/>
+              <a:t>Git</a:t>
+            </a:r>
+            <a:r>
+              <a:rPr lang="ru-RU" dirty="0" smtClean="0"/>
+              <a:t> </a:t>
+            </a:r>
+            <a:r>
+              <a:rPr lang="ru-RU" dirty="0" err="1" smtClean="0"/>
+              <a:t>Rebase</a:t>
+            </a:r>
+            <a:r>
+              <a:rPr lang="ru-RU" dirty="0" smtClean="0"/>
+              <a:t>: руководство по </a:t>
+            </a:r>
+            <a:r>
+              <a:rPr lang="ru-RU" dirty="0" smtClean="0"/>
+              <a:t>использованию</a:t>
+            </a:r>
+            <a:r>
+              <a:rPr lang="en-US" dirty="0" smtClean="0"/>
+              <a:t>”.</a:t>
+            </a:r>
+          </a:p>
+          <a:p>
+            <a:endParaRPr lang="en-US" dirty="0" smtClean="0"/>
+          </a:p>
+          <a:p>
+            <a:endParaRPr lang="ru-RU" b="1" dirty="0" smtClean="0"/>
+          </a:p>
           <a:p>
             <a:endParaRPr lang="en-US" dirty="0"/>
           </a:p>

</xml_diff>